<commit_message>
Small edit on figure to fix typo
</commit_message>
<xml_diff>
--- a/manuscripts/DETECT2020/source/figures/Diagrams.pptx
+++ b/manuscripts/DETECT2020/source/figures/Diagrams.pptx
@@ -202,7 +202,7 @@
           <a:p>
             <a:fld id="{7D74606A-B61D-D347-B748-EF32FB610A1A}" type="datetimeFigureOut">
               <a:rPr lang="en-US" smtClean="0"/>
-              <a:t>6/25/20</a:t>
+              <a:t>9/1/20</a:t>
             </a:fld>
             <a:endParaRPr lang="en-US"/>
           </a:p>
@@ -700,7 +700,7 @@
           <a:p>
             <a:fld id="{3F17AAA4-97D1-8441-B9B5-03EA66229AFE}" type="datetimeFigureOut">
               <a:rPr lang="en-US" smtClean="0"/>
-              <a:t>6/25/20</a:t>
+              <a:t>9/1/20</a:t>
             </a:fld>
             <a:endParaRPr lang="en-US"/>
           </a:p>
@@ -898,7 +898,7 @@
           <a:p>
             <a:fld id="{3F17AAA4-97D1-8441-B9B5-03EA66229AFE}" type="datetimeFigureOut">
               <a:rPr lang="en-US" smtClean="0"/>
-              <a:t>6/25/20</a:t>
+              <a:t>9/1/20</a:t>
             </a:fld>
             <a:endParaRPr lang="en-US"/>
           </a:p>
@@ -1106,7 +1106,7 @@
           <a:p>
             <a:fld id="{3F17AAA4-97D1-8441-B9B5-03EA66229AFE}" type="datetimeFigureOut">
               <a:rPr lang="en-US" smtClean="0"/>
-              <a:t>6/25/20</a:t>
+              <a:t>9/1/20</a:t>
             </a:fld>
             <a:endParaRPr lang="en-US"/>
           </a:p>
@@ -1304,7 +1304,7 @@
           <a:p>
             <a:fld id="{3F17AAA4-97D1-8441-B9B5-03EA66229AFE}" type="datetimeFigureOut">
               <a:rPr lang="en-US" smtClean="0"/>
-              <a:t>6/25/20</a:t>
+              <a:t>9/1/20</a:t>
             </a:fld>
             <a:endParaRPr lang="en-US"/>
           </a:p>
@@ -1579,7 +1579,7 @@
           <a:p>
             <a:fld id="{3F17AAA4-97D1-8441-B9B5-03EA66229AFE}" type="datetimeFigureOut">
               <a:rPr lang="en-US" smtClean="0"/>
-              <a:t>6/25/20</a:t>
+              <a:t>9/1/20</a:t>
             </a:fld>
             <a:endParaRPr lang="en-US"/>
           </a:p>
@@ -1844,7 +1844,7 @@
           <a:p>
             <a:fld id="{3F17AAA4-97D1-8441-B9B5-03EA66229AFE}" type="datetimeFigureOut">
               <a:rPr lang="en-US" smtClean="0"/>
-              <a:t>6/25/20</a:t>
+              <a:t>9/1/20</a:t>
             </a:fld>
             <a:endParaRPr lang="en-US"/>
           </a:p>
@@ -2256,7 +2256,7 @@
           <a:p>
             <a:fld id="{3F17AAA4-97D1-8441-B9B5-03EA66229AFE}" type="datetimeFigureOut">
               <a:rPr lang="en-US" smtClean="0"/>
-              <a:t>6/25/20</a:t>
+              <a:t>9/1/20</a:t>
             </a:fld>
             <a:endParaRPr lang="en-US"/>
           </a:p>
@@ -2397,7 +2397,7 @@
           <a:p>
             <a:fld id="{3F17AAA4-97D1-8441-B9B5-03EA66229AFE}" type="datetimeFigureOut">
               <a:rPr lang="en-US" smtClean="0"/>
-              <a:t>6/25/20</a:t>
+              <a:t>9/1/20</a:t>
             </a:fld>
             <a:endParaRPr lang="en-US"/>
           </a:p>
@@ -2510,7 +2510,7 @@
           <a:p>
             <a:fld id="{3F17AAA4-97D1-8441-B9B5-03EA66229AFE}" type="datetimeFigureOut">
               <a:rPr lang="en-US" smtClean="0"/>
-              <a:t>6/25/20</a:t>
+              <a:t>9/1/20</a:t>
             </a:fld>
             <a:endParaRPr lang="en-US"/>
           </a:p>
@@ -2821,7 +2821,7 @@
           <a:p>
             <a:fld id="{3F17AAA4-97D1-8441-B9B5-03EA66229AFE}" type="datetimeFigureOut">
               <a:rPr lang="en-US" smtClean="0"/>
-              <a:t>6/25/20</a:t>
+              <a:t>9/1/20</a:t>
             </a:fld>
             <a:endParaRPr lang="en-US"/>
           </a:p>
@@ -3109,7 +3109,7 @@
           <a:p>
             <a:fld id="{3F17AAA4-97D1-8441-B9B5-03EA66229AFE}" type="datetimeFigureOut">
               <a:rPr lang="en-US" smtClean="0"/>
-              <a:t>6/25/20</a:t>
+              <a:t>9/1/20</a:t>
             </a:fld>
             <a:endParaRPr lang="en-US"/>
           </a:p>
@@ -3350,7 +3350,7 @@
           <a:p>
             <a:fld id="{3F17AAA4-97D1-8441-B9B5-03EA66229AFE}" type="datetimeFigureOut">
               <a:rPr lang="en-US" smtClean="0"/>
-              <a:t>6/25/20</a:t>
+              <a:t>9/1/20</a:t>
             </a:fld>
             <a:endParaRPr lang="en-US"/>
           </a:p>
@@ -18456,8 +18456,8 @@
                   </p:sp>
                 </mc:Fallback>
               </mc:AlternateContent>
-              <mc:AlternateContent xmlns:mc="http://schemas.openxmlformats.org/markup-compatibility/2006">
-                <mc:Choice xmlns:a14="http://schemas.microsoft.com/office/drawing/2010/main" Requires="a14">
+              <mc:AlternateContent xmlns:mc="http://schemas.openxmlformats.org/markup-compatibility/2006" xmlns:a14="http://schemas.microsoft.com/office/drawing/2010/main">
+                <mc:Choice Requires="a14">
                   <p:sp>
                     <p:nvSpPr>
                       <p:cNvPr id="104" name="TextBox 103">
@@ -18564,7 +18564,7 @@
                     </p:txBody>
                   </p:sp>
                 </mc:Choice>
-                <mc:Fallback>
+                <mc:Fallback xmlns="">
                   <p:sp>
                     <p:nvSpPr>
                       <p:cNvPr id="104" name="TextBox 103">
@@ -18609,8 +18609,8 @@
                   </p:sp>
                 </mc:Fallback>
               </mc:AlternateContent>
-              <mc:AlternateContent xmlns:mc="http://schemas.openxmlformats.org/markup-compatibility/2006">
-                <mc:Choice xmlns:a14="http://schemas.microsoft.com/office/drawing/2010/main" Requires="a14">
+              <mc:AlternateContent xmlns:mc="http://schemas.openxmlformats.org/markup-compatibility/2006" xmlns:a14="http://schemas.microsoft.com/office/drawing/2010/main">
+                <mc:Choice Requires="a14">
                   <p:sp>
                     <p:nvSpPr>
                       <p:cNvPr id="105" name="TextBox 104">
@@ -18737,7 +18737,7 @@
                     </p:txBody>
                   </p:sp>
                 </mc:Choice>
-                <mc:Fallback>
+                <mc:Fallback xmlns="">
                   <p:sp>
                     <p:nvSpPr>
                       <p:cNvPr id="105" name="TextBox 104">
@@ -19119,8 +19119,8 @@
                   </p:sp>
                 </mc:Fallback>
               </mc:AlternateContent>
-              <mc:AlternateContent xmlns:mc="http://schemas.openxmlformats.org/markup-compatibility/2006" xmlns:a14="http://schemas.microsoft.com/office/drawing/2010/main">
-                <mc:Choice Requires="a14">
+              <mc:AlternateContent xmlns:mc="http://schemas.openxmlformats.org/markup-compatibility/2006">
+                <mc:Choice xmlns:a14="http://schemas.microsoft.com/office/drawing/2010/main" Requires="a14">
                   <p:sp>
                     <p:nvSpPr>
                       <p:cNvPr id="117" name="TextBox 116">
@@ -19159,7 +19159,7 @@
                         <a:pPr algn="ctr"/>
                         <a:r>
                           <a:rPr lang="en-US" sz="2400" i="1" dirty="0" err="1"/>
-                          <a:t>fututeUntriggeredTransitionSet</a:t>
+                          <a:t>futureUntriggeredTransitionSet</a:t>
                         </a:r>
                         <a:endParaRPr lang="en-US" sz="2400" i="1" dirty="0"/>
                       </a:p>
@@ -19235,7 +19235,7 @@
                     </p:txBody>
                   </p:sp>
                 </mc:Choice>
-                <mc:Fallback xmlns="">
+                <mc:Fallback>
                   <p:sp>
                     <p:nvSpPr>
                       <p:cNvPr id="117" name="TextBox 116">
@@ -19746,8 +19746,8 @@
             </p:style>
           </p:cxnSp>
         </p:grpSp>
-        <mc:AlternateContent xmlns:mc="http://schemas.openxmlformats.org/markup-compatibility/2006">
-          <mc:Choice xmlns:a14="http://schemas.microsoft.com/office/drawing/2010/main" Requires="a14">
+        <mc:AlternateContent xmlns:mc="http://schemas.openxmlformats.org/markup-compatibility/2006" xmlns:a14="http://schemas.microsoft.com/office/drawing/2010/main">
+          <mc:Choice Requires="a14">
             <p:sp>
               <p:nvSpPr>
                 <p:cNvPr id="58" name="TextBox 57">
@@ -19958,7 +19958,7 @@
               </p:txBody>
             </p:sp>
           </mc:Choice>
-          <mc:Fallback>
+          <mc:Fallback xmlns="">
             <p:sp>
               <p:nvSpPr>
                 <p:cNvPr id="58" name="TextBox 57">

</xml_diff>